<commit_message>
Dev. Metrics and trace
</commit_message>
<xml_diff>
--- a/KrakenD_Integration_FullGuide.pptx
+++ b/KrakenD_Integration_FullGuide.pptx
@@ -10380,7 +10380,7 @@
         </p:nvSpPr>
         <p:spPr>
           <a:xfrm>
-            <a:off x="4087224" y="3455208"/>
+            <a:off x="3956596" y="2858910"/>
             <a:ext cx="4306824" cy="2344708"/>
           </a:xfrm>
           <a:prstGeom prst="rect">
@@ -10405,25 +10405,101 @@
               </a:spcAft>
             </a:pPr>
             <a:r>
-              <a:rPr lang="en-US" sz="2400" b="1"/>
+              <a:rPr lang="en-US" sz="2400" b="1" dirty="0"/>
               <a:t>Circuit-Break</a:t>
             </a:r>
             <a:br>
-              <a:rPr lang="en-US" sz="1700"/>
+              <a:rPr lang="en-US" sz="1700" dirty="0"/>
             </a:br>
             <a:r>
-              <a:rPr lang="en-US" sz="1700"/>
-              <a:t>การป้องกัน backend (Upstream) ไม่ให้ทำงานหนักจนเกินไป </a:t>
+              <a:rPr lang="en-US" sz="1700" dirty="0" err="1"/>
+              <a:t>การป้องกัน</a:t>
+            </a:r>
+            <a:r>
+              <a:rPr lang="en-US" sz="1700" dirty="0"/>
+              <a:t> backend (Upstream) </a:t>
+            </a:r>
+            <a:r>
+              <a:rPr lang="en-US" sz="1700" dirty="0" err="1"/>
+              <a:t>ไม่ให้ทำงานหนักจนเกินไป</a:t>
+            </a:r>
+            <a:r>
+              <a:rPr lang="en-US" sz="1700" dirty="0"/>
+              <a:t> </a:t>
             </a:r>
             <a:br>
-              <a:rPr lang="en-US" sz="1700"/>
+              <a:rPr lang="en-US" sz="1700" dirty="0"/>
             </a:br>
             <a:br>
-              <a:rPr lang="en-US" sz="1700"/>
+              <a:rPr lang="en-US" sz="1700" dirty="0"/>
             </a:br>
             <a:r>
-              <a:rPr lang="en-US" sz="1700"/>
-              <a:t>ใน 10 วินาที หากมี Error เกิดขึ้นจำนวน &gt; 2 ครั้ง Krakend จะไม่ไปเรียก Backend นั้น จนกว่าจะสามารถใช้งานได้</a:t>
+              <a:rPr lang="en-US" sz="1700" dirty="0" err="1"/>
+              <a:t>ใน</a:t>
+            </a:r>
+            <a:r>
+              <a:rPr lang="en-US" sz="1700" dirty="0"/>
+              <a:t> 10 </a:t>
+            </a:r>
+            <a:r>
+              <a:rPr lang="en-US" sz="1700" dirty="0" err="1"/>
+              <a:t>วินาที</a:t>
+            </a:r>
+            <a:r>
+              <a:rPr lang="en-US" sz="1700" dirty="0"/>
+              <a:t> </a:t>
+            </a:r>
+            <a:r>
+              <a:rPr lang="en-US" sz="1700" dirty="0" err="1"/>
+              <a:t>หากมี</a:t>
+            </a:r>
+            <a:r>
+              <a:rPr lang="en-US" sz="1700" dirty="0"/>
+              <a:t> Error </a:t>
+            </a:r>
+            <a:r>
+              <a:rPr lang="en-US" sz="1700" dirty="0" err="1"/>
+              <a:t>เกิดขึ้นจำนวน</a:t>
+            </a:r>
+            <a:r>
+              <a:rPr lang="en-US" sz="1700" dirty="0"/>
+              <a:t> &gt; 2 </a:t>
+            </a:r>
+            <a:r>
+              <a:rPr lang="en-US" sz="1700" dirty="0" err="1"/>
+              <a:t>ครั้ง</a:t>
+            </a:r>
+            <a:r>
+              <a:rPr lang="en-US" sz="1700" dirty="0"/>
+              <a:t> </a:t>
+            </a:r>
+            <a:r>
+              <a:rPr lang="en-US" sz="1700" dirty="0" err="1"/>
+              <a:t>Krakend</a:t>
+            </a:r>
+            <a:r>
+              <a:rPr lang="en-US" sz="1700" dirty="0"/>
+              <a:t> </a:t>
+            </a:r>
+            <a:r>
+              <a:rPr lang="en-US" sz="1700" dirty="0" err="1"/>
+              <a:t>จะไม่ไปเรียก</a:t>
+            </a:r>
+            <a:r>
+              <a:rPr lang="en-US" sz="1700" dirty="0"/>
+              <a:t> Backend </a:t>
+            </a:r>
+            <a:r>
+              <a:rPr lang="en-US" sz="1700" dirty="0" err="1"/>
+              <a:t>นั้น</a:t>
+            </a:r>
+            <a:r>
+              <a:rPr lang="en-US" sz="1700" dirty="0"/>
+              <a:t> </a:t>
+            </a:r>
+            <a:r>
+              <a:rPr lang="en-US" sz="1700" dirty="0" err="1"/>
+              <a:t>จนกว่าจะสามารถใช้งานได้</a:t>
             </a:r>
             <a:endParaRPr lang="en-US" sz="1700" dirty="0"/>
           </a:p>
@@ -10498,6 +10574,36 @@
           </a:p>
         </p:txBody>
       </p:sp>
+      <p:pic>
+        <p:nvPicPr>
+          <p:cNvPr id="5" name="Picture 4">
+            <a:extLst>
+              <a:ext uri="{FF2B5EF4-FFF2-40B4-BE49-F238E27FC236}">
+                <a16:creationId xmlns:a16="http://schemas.microsoft.com/office/drawing/2014/main" id="{8ED7C454-BF4C-DAC8-F1A9-7F58B76EB107}"/>
+              </a:ext>
+            </a:extLst>
+          </p:cNvPr>
+          <p:cNvPicPr>
+            <a:picLocks noChangeAspect="1"/>
+          </p:cNvPicPr>
+          <p:nvPr/>
+        </p:nvPicPr>
+        <p:blipFill>
+          <a:blip r:embed="rId4"/>
+          <a:stretch>
+            <a:fillRect/>
+          </a:stretch>
+        </p:blipFill>
+        <p:spPr>
+          <a:xfrm>
+            <a:off x="3956596" y="4715825"/>
+            <a:ext cx="4112963" cy="1937926"/>
+          </a:xfrm>
+          <a:prstGeom prst="rect">
+            <a:avLst/>
+          </a:prstGeom>
+        </p:spPr>
+      </p:pic>
     </p:spTree>
     <p:extLst>
       <p:ext uri="{BB962C8B-B14F-4D97-AF65-F5344CB8AC3E}">

</xml_diff>